<commit_message>
data collection. Added first report
</commit_message>
<xml_diff>
--- a/report/Infineon_PSOC6_Lecture_Project_Status_Template.pptx
+++ b/report/Infineon_PSOC6_Lecture_Project_Status_Template.pptx
@@ -438,7 +438,7 @@
                 <a:cs typeface="Arial" panose="020B0604020202020204" pitchFamily="34" charset="0"/>
               </a:rPr>
               <a:pPr/>
-              <a:t>‹#›</a:t>
+              <a:t>‹Nr.›</a:t>
             </a:fld>
             <a:endParaRPr lang="en-US" sz="800" dirty="0">
               <a:solidFill>
@@ -1315,7 +1315,7 @@
                 <a:cs typeface="Arial" panose="020B0604020202020204" pitchFamily="34" charset="0"/>
               </a:rPr>
               <a:pPr/>
-              <a:t>‹#›</a:t>
+              <a:t>‹Nr.›</a:t>
             </a:fld>
             <a:endParaRPr lang="en-US" dirty="0">
               <a:latin typeface="Arial" panose="020B0604020202020204" pitchFamily="34" charset="0"/>
@@ -19453,7 +19453,7 @@
                 <a:buNone/>
                 <a:tabLst/>
               </a:pPr>
-              <a:t>‹#›</a:t>
+              <a:t>‹Nr.›</a:t>
             </a:fld>
             <a:endParaRPr lang="en-US" sz="800" b="1" kern="0" baseline="0">
               <a:solidFill>
@@ -20160,7 +20160,7 @@
         </p:nvSpPr>
         <p:spPr bwMode="auto">
           <a:xfrm>
-            <a:off x="336449" y="2223329"/>
+            <a:off x="343317" y="2209138"/>
             <a:ext cx="3671832" cy="4142274"/>
           </a:xfrm>
           <a:prstGeom prst="roundRect">
@@ -20224,8 +20224,131 @@
                   <a:schemeClr val="tx1"/>
                 </a:solidFill>
               </a:rPr>
-              <a:t>text</a:t>
-            </a:r>
+              <a:t>Reviewed lecture contents and deepened the understanding of all the software tools</a:t>
+            </a:r>
+            <a:endParaRPr lang="de-DE" dirty="0">
+              <a:solidFill>
+                <a:schemeClr val="tx1"/>
+              </a:solidFill>
+            </a:endParaRPr>
+          </a:p>
+          <a:p>
+            <a:pPr marL="285750" indent="-285750" defTabSz="576000" eaLnBrk="0" hangingPunct="0">
+              <a:lnSpc>
+                <a:spcPct val="120000"/>
+              </a:lnSpc>
+              <a:buFont typeface="Arial" panose="020B0604020202020204" pitchFamily="34" charset="0"/>
+              <a:buChar char="•"/>
+            </a:pPr>
+            <a:r>
+              <a:rPr lang="en-US" dirty="0">
+                <a:solidFill>
+                  <a:schemeClr val="tx1"/>
+                </a:solidFill>
+              </a:rPr>
+              <a:t>Successfully connected the microcontroller to </a:t>
+            </a:r>
+            <a:r>
+              <a:rPr lang="en-US" dirty="0" err="1">
+                <a:solidFill>
+                  <a:schemeClr val="tx1"/>
+                </a:solidFill>
+              </a:rPr>
+              <a:t>Deepcraft</a:t>
+            </a:r>
+            <a:r>
+              <a:rPr lang="en-US" dirty="0">
+                <a:solidFill>
+                  <a:schemeClr val="tx1"/>
+                </a:solidFill>
+              </a:rPr>
+              <a:t> Studio via the private </a:t>
+            </a:r>
+            <a:r>
+              <a:rPr lang="en-US" dirty="0" err="1">
+                <a:solidFill>
+                  <a:schemeClr val="tx1"/>
+                </a:solidFill>
+              </a:rPr>
+              <a:t>WiFi</a:t>
+            </a:r>
+            <a:r>
+              <a:rPr lang="en-US" dirty="0">
+                <a:solidFill>
+                  <a:schemeClr val="tx1"/>
+                </a:solidFill>
+              </a:rPr>
+              <a:t> and hotspot</a:t>
+            </a:r>
+            <a:endParaRPr lang="de-DE" dirty="0">
+              <a:solidFill>
+                <a:schemeClr val="tx1"/>
+              </a:solidFill>
+            </a:endParaRPr>
+          </a:p>
+          <a:p>
+            <a:pPr marL="285750" indent="-285750" defTabSz="576000" eaLnBrk="0" hangingPunct="0">
+              <a:lnSpc>
+                <a:spcPct val="120000"/>
+              </a:lnSpc>
+              <a:buFont typeface="Arial" panose="020B0604020202020204" pitchFamily="34" charset="0"/>
+              <a:buChar char="•"/>
+            </a:pPr>
+            <a:r>
+              <a:rPr lang="en-US" dirty="0">
+                <a:solidFill>
+                  <a:schemeClr val="tx1"/>
+                </a:solidFill>
+              </a:rPr>
+              <a:t>Initialized the necessary </a:t>
+            </a:r>
+            <a:r>
+              <a:rPr lang="en-US" dirty="0" err="1">
+                <a:solidFill>
+                  <a:schemeClr val="tx1"/>
+                </a:solidFill>
+              </a:rPr>
+              <a:t>Deepcraft</a:t>
+            </a:r>
+            <a:r>
+              <a:rPr lang="en-US" dirty="0">
+                <a:solidFill>
+                  <a:schemeClr val="tx1"/>
+                </a:solidFill>
+              </a:rPr>
+              <a:t> projects and configured the preprocessor for training the models</a:t>
+            </a:r>
+          </a:p>
+          <a:p>
+            <a:pPr marL="285750" indent="-285750" defTabSz="576000" eaLnBrk="0" hangingPunct="0">
+              <a:lnSpc>
+                <a:spcPct val="120000"/>
+              </a:lnSpc>
+              <a:buFont typeface="Arial" panose="020B0604020202020204" pitchFamily="34" charset="0"/>
+              <a:buChar char="•"/>
+            </a:pPr>
+            <a:r>
+              <a:rPr lang="en-US" dirty="0">
+                <a:solidFill>
+                  <a:schemeClr val="tx1"/>
+                </a:solidFill>
+              </a:rPr>
+              <a:t>Started the initial phase of data collection</a:t>
+            </a:r>
+          </a:p>
+          <a:p>
+            <a:pPr marL="285750" indent="-285750" defTabSz="576000" eaLnBrk="0" hangingPunct="0">
+              <a:lnSpc>
+                <a:spcPct val="120000"/>
+              </a:lnSpc>
+              <a:buFont typeface="Arial" panose="020B0604020202020204" pitchFamily="34" charset="0"/>
+              <a:buChar char="•"/>
+            </a:pPr>
+            <a:endParaRPr lang="en-US" dirty="0">
+              <a:solidFill>
+                <a:schemeClr val="tx1"/>
+              </a:solidFill>
+            </a:endParaRPr>
           </a:p>
         </p:txBody>
       </p:sp>
@@ -20307,7 +20430,57 @@
                   <a:schemeClr val="tx1"/>
                 </a:solidFill>
               </a:rPr>
-              <a:t>text</a:t>
+              <a:t>Conduct more data acquisition sessions over the weekend, involving multiple test subjects</a:t>
+            </a:r>
+          </a:p>
+          <a:p>
+            <a:pPr marL="285750" indent="-285750" defTabSz="576000" eaLnBrk="0" hangingPunct="0">
+              <a:lnSpc>
+                <a:spcPct val="120000"/>
+              </a:lnSpc>
+              <a:buFont typeface="Arial" panose="020B0604020202020204" pitchFamily="34" charset="0"/>
+              <a:buChar char="•"/>
+            </a:pPr>
+            <a:r>
+              <a:rPr lang="en-US" dirty="0">
+                <a:solidFill>
+                  <a:schemeClr val="tx1"/>
+                </a:solidFill>
+              </a:rPr>
+              <a:t>Train the first AI-models based on our data</a:t>
+            </a:r>
+          </a:p>
+          <a:p>
+            <a:pPr marL="285750" indent="-285750" defTabSz="576000" eaLnBrk="0" hangingPunct="0">
+              <a:lnSpc>
+                <a:spcPct val="120000"/>
+              </a:lnSpc>
+              <a:buFont typeface="Arial" panose="020B0604020202020204" pitchFamily="34" charset="0"/>
+              <a:buChar char="•"/>
+            </a:pPr>
+            <a:r>
+              <a:rPr lang="en-US" dirty="0">
+                <a:solidFill>
+                  <a:schemeClr val="tx1"/>
+                </a:solidFill>
+              </a:rPr>
+              <a:t>Begin to integrate the model into a </a:t>
+            </a:r>
+            <a:r>
+              <a:rPr lang="en-US" dirty="0" err="1">
+                <a:solidFill>
+                  <a:schemeClr val="tx1"/>
+                </a:solidFill>
+              </a:rPr>
+              <a:t>micropython</a:t>
+            </a:r>
+            <a:r>
+              <a:rPr lang="en-US" dirty="0">
+                <a:solidFill>
+                  <a:schemeClr val="tx1"/>
+                </a:solidFill>
+              </a:rPr>
+              <a:t> code</a:t>
             </a:r>
           </a:p>
         </p:txBody>
@@ -20390,8 +20563,22 @@
                   <a:schemeClr val="tx1"/>
                 </a:solidFill>
               </a:rPr>
-              <a:t>text</a:t>
-            </a:r>
+              <a:t>Clarification between the “train”, “validation” and “test” datasets and their differences</a:t>
+            </a:r>
+          </a:p>
+          <a:p>
+            <a:pPr marL="285750" indent="-285750" defTabSz="576000" eaLnBrk="0" hangingPunct="0">
+              <a:lnSpc>
+                <a:spcPct val="120000"/>
+              </a:lnSpc>
+              <a:buFont typeface="Arial" panose="020B0604020202020204" pitchFamily="34" charset="0"/>
+              <a:buChar char="•"/>
+            </a:pPr>
+            <a:endParaRPr lang="en-US" dirty="0">
+              <a:solidFill>
+                <a:schemeClr val="tx1"/>
+              </a:solidFill>
+            </a:endParaRPr>
           </a:p>
         </p:txBody>
       </p:sp>
@@ -24067,16 +24254,16 @@
 <file path=customXml/itemProps3.xml><?xml version="1.0" encoding="utf-8"?>
 <ds:datastoreItem xmlns:ds="http://schemas.openxmlformats.org/officeDocument/2006/customXml" ds:itemID="{D299A1D5-F553-4264-9022-E0136C61CE27}">
   <ds:schemaRefs>
+    <ds:schemaRef ds:uri="http://schemas.microsoft.com/sharepoint/v3"/>
+    <ds:schemaRef ds:uri="http://schemas.microsoft.com/office/2006/documentManagement/types"/>
+    <ds:schemaRef ds:uri="http://purl.org/dc/terms/"/>
+    <ds:schemaRef ds:uri="http://purl.org/dc/elements/1.1/"/>
+    <ds:schemaRef ds:uri="http://purl.org/dc/dcmitype/"/>
     <ds:schemaRef ds:uri="http://schemas.microsoft.com/office/infopath/2007/PartnerControls"/>
+    <ds:schemaRef ds:uri="http://www.w3.org/XML/1998/namespace"/>
+    <ds:schemaRef ds:uri="http://schemas.openxmlformats.org/package/2006/metadata/core-properties"/>
     <ds:schemaRef ds:uri="3df75a81-b7cb-4783-ab8b-190cb7919186"/>
-    <ds:schemaRef ds:uri="http://purl.org/dc/elements/1.1/"/>
-    <ds:schemaRef ds:uri="http://schemas.microsoft.com/office/2006/documentManagement/types"/>
-    <ds:schemaRef ds:uri="http://schemas.microsoft.com/sharepoint/v3"/>
-    <ds:schemaRef ds:uri="http://schemas.openxmlformats.org/package/2006/metadata/core-properties"/>
     <ds:schemaRef ds:uri="http://schemas.microsoft.com/office/2006/metadata/properties"/>
-    <ds:schemaRef ds:uri="http://www.w3.org/XML/1998/namespace"/>
-    <ds:schemaRef ds:uri="http://purl.org/dc/dcmitype/"/>
-    <ds:schemaRef ds:uri="http://purl.org/dc/terms/"/>
   </ds:schemaRefs>
 </ds:datastoreItem>
 </file>

</xml_diff>